<commit_message>
Changed the word, 'callback', to 'done' in the examples.
</commit_message>
<xml_diff>
--- a/node/lesson-65-async/async.pptx
+++ b/node/lesson-65-async/async.pptx
@@ -33,7 +33,7 @@
   <p:sldSz cx="9144000" cy="6858000" type="screen4x3"/>
   <p:notesSz cx="6858000" cy="9144000"/>
   <p:custDataLst>
-    <p:tags r:id="rId23"/>
+    <p:tags r:id="rId22"/>
   </p:custDataLst>
   <p:defaultTextStyle>
     <a:defPPr>
@@ -130,6 +130,71 @@
       </a:defRPr>
     </a:lvl9pPr>
   </p:defaultTextStyle>
+  <p:extLst>
+    <p:ext uri="{EFAFB233-063F-42B5-8137-9DF3F51BA10A}">
+      <p15:sldGuideLst xmlns:p15="http://schemas.microsoft.com/office/powerpoint/2012/main">
+        <p15:guide id="1" orient="horz" pos="4176">
+          <p15:clr>
+            <a:srgbClr val="A4A3A4"/>
+          </p15:clr>
+        </p15:guide>
+        <p15:guide id="2" orient="horz" pos="607">
+          <p15:clr>
+            <a:srgbClr val="A4A3A4"/>
+          </p15:clr>
+        </p15:guide>
+        <p15:guide id="3" orient="horz" pos="212">
+          <p15:clr>
+            <a:srgbClr val="A4A3A4"/>
+          </p15:clr>
+        </p15:guide>
+        <p15:guide id="4" orient="horz" pos="912">
+          <p15:clr>
+            <a:srgbClr val="A4A3A4"/>
+          </p15:clr>
+        </p15:guide>
+        <p15:guide id="5" orient="horz" pos="3969">
+          <p15:clr>
+            <a:srgbClr val="A4A3A4"/>
+          </p15:clr>
+        </p15:guide>
+        <p15:guide id="6" pos="1267">
+          <p15:clr>
+            <a:srgbClr val="A4A3A4"/>
+          </p15:clr>
+        </p15:guide>
+        <p15:guide id="7" pos="382">
+          <p15:clr>
+            <a:srgbClr val="A4A3A4"/>
+          </p15:clr>
+        </p15:guide>
+        <p15:guide id="8" pos="2880">
+          <p15:clr>
+            <a:srgbClr val="A4A3A4"/>
+          </p15:clr>
+        </p15:guide>
+        <p15:guide id="9" pos="5568">
+          <p15:clr>
+            <a:srgbClr val="A4A3A4"/>
+          </p15:clr>
+        </p15:guide>
+      </p15:sldGuideLst>
+    </p:ext>
+    <p:ext uri="{2D200454-40CA-4A62-9FC3-DE9A4176ACB9}">
+      <p15:notesGuideLst xmlns:p15="http://schemas.microsoft.com/office/powerpoint/2012/main">
+        <p15:guide id="1" orient="horz" pos="2880">
+          <p15:clr>
+            <a:srgbClr val="A4A3A4"/>
+          </p15:clr>
+        </p15:guide>
+        <p15:guide id="2" pos="2160">
+          <p15:clr>
+            <a:srgbClr val="A4A3A4"/>
+          </p15:clr>
+        </p15:guide>
+      </p15:notesGuideLst>
+    </p:ext>
+  </p:extLst>
 </p:presentation>
 </file>
 
@@ -1233,7 +1298,7 @@
   <p:timing>
     <p:tnLst>
       <p:par>
-        <p:cTn xmlns:p14="http://schemas.microsoft.com/office/powerpoint/2010/main" id="1" dur="indefinite" restart="never" nodeType="tmRoot"/>
+        <p:cTn id="1" dur="indefinite" restart="never" nodeType="tmRoot"/>
       </p:par>
     </p:tnLst>
   </p:timing>
@@ -1289,7 +1354,7 @@
           <a:noFill/>
           <a:extLst>
             <a:ext uri="{909E8E84-426E-40dd-AFC4-6F175D3DCCD1}">
-              <a14:hiddenFill xmlns:a14="http://schemas.microsoft.com/office/drawing/2010/main">
+              <a14:hiddenFill xmlns:a14="http://schemas.microsoft.com/office/drawing/2010/main" xmlns="">
                 <a:solidFill>
                   <a:srgbClr val="FFFFFF"/>
                 </a:solidFill>
@@ -1444,7 +1509,7 @@
   <p:timing>
     <p:tnLst>
       <p:par>
-        <p:cTn xmlns:p14="http://schemas.microsoft.com/office/powerpoint/2010/main" id="1" dur="indefinite" restart="never" nodeType="tmRoot"/>
+        <p:cTn id="1" dur="indefinite" restart="never" nodeType="tmRoot"/>
       </p:par>
     </p:tnLst>
   </p:timing>
@@ -1899,7 +1964,7 @@
   <p:timing>
     <p:tnLst>
       <p:par>
-        <p:cTn xmlns:p14="http://schemas.microsoft.com/office/powerpoint/2010/main" id="1" dur="indefinite" restart="never" nodeType="tmRoot"/>
+        <p:cTn id="1" dur="indefinite" restart="never" nodeType="tmRoot"/>
       </p:par>
     </p:tnLst>
   </p:timing>
@@ -2239,7 +2304,7 @@
   <p:timing>
     <p:tnLst>
       <p:par>
-        <p:cTn xmlns:p14="http://schemas.microsoft.com/office/powerpoint/2010/main" id="1" dur="indefinite" restart="never" nodeType="tmRoot"/>
+        <p:cTn id="1" dur="indefinite" restart="never" nodeType="tmRoot"/>
       </p:par>
     </p:tnLst>
   </p:timing>
@@ -2727,7 +2792,7 @@
   <p:timing>
     <p:tnLst>
       <p:par>
-        <p:cTn xmlns:p14="http://schemas.microsoft.com/office/powerpoint/2010/main" id="1" dur="indefinite" restart="never" nodeType="tmRoot"/>
+        <p:cTn id="1" dur="indefinite" restart="never" nodeType="tmRoot"/>
       </p:par>
     </p:tnLst>
   </p:timing>
@@ -3086,7 +3151,7 @@
   <p:timing>
     <p:tnLst>
       <p:par>
-        <p:cTn xmlns:p14="http://schemas.microsoft.com/office/powerpoint/2010/main" id="1" dur="indefinite" restart="never" nodeType="tmRoot"/>
+        <p:cTn id="1" dur="indefinite" restart="never" nodeType="tmRoot"/>
       </p:par>
     </p:tnLst>
   </p:timing>
@@ -4093,7 +4158,7 @@
   <p:timing>
     <p:tnLst>
       <p:par>
-        <p:cTn xmlns:p14="http://schemas.microsoft.com/office/powerpoint/2010/main" id="1" dur="indefinite" restart="never" nodeType="tmRoot"/>
+        <p:cTn id="1" dur="indefinite" restart="never" nodeType="tmRoot"/>
       </p:par>
     </p:tnLst>
   </p:timing>
@@ -4228,7 +4293,7 @@
   <p:timing>
     <p:tnLst>
       <p:par>
-        <p:cTn xmlns:p14="http://schemas.microsoft.com/office/powerpoint/2010/main" id="1" dur="indefinite" restart="never" nodeType="tmRoot"/>
+        <p:cTn id="1" dur="indefinite" restart="never" nodeType="tmRoot"/>
       </p:par>
     </p:tnLst>
   </p:timing>
@@ -4432,7 +4497,7 @@
         <p:spPr>
           <a:xfrm>
             <a:off x="457199" y="1725983"/>
-            <a:ext cx="5840981" cy="4713599"/>
+            <a:ext cx="5474576" cy="4713598"/>
           </a:xfrm>
           <a:prstGeom prst="rect">
             <a:avLst/>
@@ -4522,7 +4587,29 @@
                 <a:ea typeface="Monaco"/>
                 <a:cs typeface="Monaco"/>
               </a:rPr>
-              <a:t> : function(callback) {</a:t>
+              <a:t> : </a:t>
+            </a:r>
+            <a:r>
+              <a:rPr lang="en-US" sz="1050" dirty="0" smtClean="0">
+                <a:solidFill>
+                  <a:srgbClr val="000000"/>
+                </a:solidFill>
+                <a:latin typeface="Monaco"/>
+                <a:ea typeface="Monaco"/>
+                <a:cs typeface="Monaco"/>
+              </a:rPr>
+              <a:t>function(done) </a:t>
+            </a:r>
+            <a:r>
+              <a:rPr lang="en-US" sz="1050" dirty="0">
+                <a:solidFill>
+                  <a:srgbClr val="000000"/>
+                </a:solidFill>
+                <a:latin typeface="Monaco"/>
+                <a:ea typeface="Monaco"/>
+                <a:cs typeface="Monaco"/>
+              </a:rPr>
+              <a:t>{</a:t>
             </a:r>
           </a:p>
           <a:p>
@@ -4592,7 +4679,40 @@
                 <a:ea typeface="Monaco"/>
                 <a:cs typeface="Monaco"/>
               </a:rPr>
-              <a:t>    callback(null, 'data', 'converted to array');</a:t>
+              <a:t>    </a:t>
+            </a:r>
+            <a:r>
+              <a:rPr lang="en-US" sz="1050" dirty="0" smtClean="0">
+                <a:solidFill>
+                  <a:srgbClr val="000000"/>
+                </a:solidFill>
+                <a:latin typeface="Monaco"/>
+                <a:ea typeface="Monaco"/>
+                <a:cs typeface="Monaco"/>
+              </a:rPr>
+              <a:t>done</a:t>
+            </a:r>
+            <a:r>
+              <a:rPr lang="en-US" sz="1050" dirty="0" smtClean="0">
+                <a:solidFill>
+                  <a:srgbClr val="000000"/>
+                </a:solidFill>
+                <a:latin typeface="Monaco"/>
+                <a:ea typeface="Monaco"/>
+                <a:cs typeface="Monaco"/>
+              </a:rPr>
+              <a:t>(null</a:t>
+            </a:r>
+            <a:r>
+              <a:rPr lang="en-US" sz="1050" dirty="0">
+                <a:solidFill>
+                  <a:srgbClr val="000000"/>
+                </a:solidFill>
+                <a:latin typeface="Monaco"/>
+                <a:ea typeface="Monaco"/>
+                <a:cs typeface="Monaco"/>
+              </a:rPr>
+              <a:t>, 'data', 'converted to array');</a:t>
             </a:r>
           </a:p>
           <a:p>
@@ -4662,7 +4782,29 @@
                 <a:ea typeface="Monaco"/>
                 <a:cs typeface="Monaco"/>
               </a:rPr>
-              <a:t> : function(callback) {</a:t>
+              <a:t> : </a:t>
+            </a:r>
+            <a:r>
+              <a:rPr lang="en-US" sz="1050" dirty="0" smtClean="0">
+                <a:solidFill>
+                  <a:srgbClr val="000000"/>
+                </a:solidFill>
+                <a:latin typeface="Monaco"/>
+                <a:ea typeface="Monaco"/>
+                <a:cs typeface="Monaco"/>
+              </a:rPr>
+              <a:t>function(done) </a:t>
+            </a:r>
+            <a:r>
+              <a:rPr lang="en-US" sz="1050" dirty="0">
+                <a:solidFill>
+                  <a:srgbClr val="000000"/>
+                </a:solidFill>
+                <a:latin typeface="Monaco"/>
+                <a:ea typeface="Monaco"/>
+                <a:cs typeface="Monaco"/>
+              </a:rPr>
+              <a:t>{</a:t>
             </a:r>
           </a:p>
           <a:p>
@@ -4732,7 +4874,40 @@
                 <a:ea typeface="Monaco"/>
                 <a:cs typeface="Monaco"/>
               </a:rPr>
-              <a:t>    callback(null, 'folder');</a:t>
+              <a:t>    </a:t>
+            </a:r>
+            <a:r>
+              <a:rPr lang="en-US" sz="1050" dirty="0" smtClean="0">
+                <a:solidFill>
+                  <a:srgbClr val="000000"/>
+                </a:solidFill>
+                <a:latin typeface="Monaco"/>
+                <a:ea typeface="Monaco"/>
+                <a:cs typeface="Monaco"/>
+              </a:rPr>
+              <a:t>done</a:t>
+            </a:r>
+            <a:r>
+              <a:rPr lang="en-US" sz="1050" dirty="0" smtClean="0">
+                <a:solidFill>
+                  <a:srgbClr val="000000"/>
+                </a:solidFill>
+                <a:latin typeface="Monaco"/>
+                <a:ea typeface="Monaco"/>
+                <a:cs typeface="Monaco"/>
+              </a:rPr>
+              <a:t>(null</a:t>
+            </a:r>
+            <a:r>
+              <a:rPr lang="en-US" sz="1050" dirty="0">
+                <a:solidFill>
+                  <a:srgbClr val="000000"/>
+                </a:solidFill>
+                <a:latin typeface="Monaco"/>
+                <a:ea typeface="Monaco"/>
+                <a:cs typeface="Monaco"/>
+              </a:rPr>
+              <a:t>, 'folder');</a:t>
             </a:r>
           </a:p>
           <a:p>
@@ -4846,7 +5021,29 @@
                 <a:ea typeface="Monaco"/>
                 <a:cs typeface="Monaco"/>
               </a:rPr>
-              <a:t>', function(callback, results) {</a:t>
+              <a:t>', </a:t>
+            </a:r>
+            <a:r>
+              <a:rPr lang="en-US" sz="1050" dirty="0" smtClean="0">
+                <a:solidFill>
+                  <a:srgbClr val="000000"/>
+                </a:solidFill>
+                <a:latin typeface="Monaco"/>
+                <a:ea typeface="Monaco"/>
+                <a:cs typeface="Monaco"/>
+              </a:rPr>
+              <a:t>function(done, </a:t>
+            </a:r>
+            <a:r>
+              <a:rPr lang="en-US" sz="1050" dirty="0">
+                <a:solidFill>
+                  <a:srgbClr val="000000"/>
+                </a:solidFill>
+                <a:latin typeface="Monaco"/>
+                <a:ea typeface="Monaco"/>
+                <a:cs typeface="Monaco"/>
+              </a:rPr>
+              <a:t>results) {</a:t>
             </a:r>
           </a:p>
           <a:p>
@@ -4916,7 +5113,40 @@
                 <a:ea typeface="Monaco"/>
                 <a:cs typeface="Monaco"/>
               </a:rPr>
-              <a:t>    callback(null, 'filename');</a:t>
+              <a:t>    </a:t>
+            </a:r>
+            <a:r>
+              <a:rPr lang="en-US" sz="1050" dirty="0" smtClean="0">
+                <a:solidFill>
+                  <a:srgbClr val="000000"/>
+                </a:solidFill>
+                <a:latin typeface="Monaco"/>
+                <a:ea typeface="Monaco"/>
+                <a:cs typeface="Monaco"/>
+              </a:rPr>
+              <a:t>done</a:t>
+            </a:r>
+            <a:r>
+              <a:rPr lang="en-US" sz="1050" dirty="0" smtClean="0">
+                <a:solidFill>
+                  <a:srgbClr val="000000"/>
+                </a:solidFill>
+                <a:latin typeface="Monaco"/>
+                <a:ea typeface="Monaco"/>
+                <a:cs typeface="Monaco"/>
+              </a:rPr>
+              <a:t>(null</a:t>
+            </a:r>
+            <a:r>
+              <a:rPr lang="en-US" sz="1050" dirty="0">
+                <a:solidFill>
+                  <a:srgbClr val="000000"/>
+                </a:solidFill>
+                <a:latin typeface="Monaco"/>
+                <a:ea typeface="Monaco"/>
+                <a:cs typeface="Monaco"/>
+              </a:rPr>
+              <a:t>, 'filename');</a:t>
             </a:r>
           </a:p>
           <a:p>
@@ -5008,7 +5238,29 @@
                 <a:ea typeface="Monaco"/>
                 <a:cs typeface="Monaco"/>
               </a:rPr>
-              <a:t>', function(callback, results) {</a:t>
+              <a:t>', </a:t>
+            </a:r>
+            <a:r>
+              <a:rPr lang="en-US" sz="1050" dirty="0" smtClean="0">
+                <a:solidFill>
+                  <a:srgbClr val="000000"/>
+                </a:solidFill>
+                <a:latin typeface="Monaco"/>
+                <a:ea typeface="Monaco"/>
+                <a:cs typeface="Monaco"/>
+              </a:rPr>
+              <a:t>function(done, </a:t>
+            </a:r>
+            <a:r>
+              <a:rPr lang="en-US" sz="1050" dirty="0">
+                <a:solidFill>
+                  <a:srgbClr val="000000"/>
+                </a:solidFill>
+                <a:latin typeface="Monaco"/>
+                <a:ea typeface="Monaco"/>
+                <a:cs typeface="Monaco"/>
+              </a:rPr>
+              <a:t>results) {</a:t>
             </a:r>
           </a:p>
           <a:p>
@@ -5078,7 +5330,40 @@
                 <a:ea typeface="Monaco"/>
                 <a:cs typeface="Monaco"/>
               </a:rPr>
-              <a:t>    callback(null, {</a:t>
+              <a:t>    </a:t>
+            </a:r>
+            <a:r>
+              <a:rPr lang="en-US" sz="1050" dirty="0" smtClean="0">
+                <a:solidFill>
+                  <a:srgbClr val="000000"/>
+                </a:solidFill>
+                <a:latin typeface="Monaco"/>
+                <a:ea typeface="Monaco"/>
+                <a:cs typeface="Monaco"/>
+              </a:rPr>
+              <a:t>done</a:t>
+            </a:r>
+            <a:r>
+              <a:rPr lang="en-US" sz="1050" dirty="0" smtClean="0">
+                <a:solidFill>
+                  <a:srgbClr val="000000"/>
+                </a:solidFill>
+                <a:latin typeface="Monaco"/>
+                <a:ea typeface="Monaco"/>
+                <a:cs typeface="Monaco"/>
+              </a:rPr>
+              <a:t>(null</a:t>
+            </a:r>
+            <a:r>
+              <a:rPr lang="en-US" sz="1050" dirty="0">
+                <a:solidFill>
+                  <a:srgbClr val="000000"/>
+                </a:solidFill>
+                <a:latin typeface="Monaco"/>
+                <a:ea typeface="Monaco"/>
+                <a:cs typeface="Monaco"/>
+              </a:rPr>
+              <a:t>, {</a:t>
             </a:r>
           </a:p>
           <a:p>
@@ -5887,7 +6172,7 @@
   <p:timing>
     <p:tnLst>
       <p:par>
-        <p:cTn xmlns:p14="http://schemas.microsoft.com/office/powerpoint/2010/main" id="1" dur="indefinite" restart="never" nodeType="tmRoot"/>
+        <p:cTn id="1" dur="indefinite" restart="never" nodeType="tmRoot"/>
       </p:par>
     </p:tnLst>
   </p:timing>
@@ -6270,7 +6555,7 @@
   <p:timing>
     <p:tnLst>
       <p:par>
-        <p:cTn xmlns:p14="http://schemas.microsoft.com/office/powerpoint/2010/main" id="1" dur="indefinite" restart="never" nodeType="tmRoot"/>
+        <p:cTn id="1" dur="indefinite" restart="never" nodeType="tmRoot"/>
       </p:par>
     </p:tnLst>
   </p:timing>
@@ -6616,7 +6901,7 @@
   <p:timing>
     <p:tnLst>
       <p:par>
-        <p:cTn xmlns:p14="http://schemas.microsoft.com/office/powerpoint/2010/main" id="1" dur="indefinite" restart="never" nodeType="tmRoot"/>
+        <p:cTn id="1" dur="indefinite" restart="never" nodeType="tmRoot"/>
       </p:par>
     </p:tnLst>
   </p:timing>
@@ -6890,7 +7175,25 @@
                 </a:solidFill>
                 <a:latin typeface="Monaco"/>
               </a:rPr>
-              <a:t> read(file, callback) {</a:t>
+              <a:t> read(file, </a:t>
+            </a:r>
+            <a:r>
+              <a:rPr lang="en-US" sz="1100" b="1" dirty="0" smtClean="0">
+                <a:solidFill>
+                  <a:srgbClr val="000000"/>
+                </a:solidFill>
+                <a:latin typeface="Monaco"/>
+              </a:rPr>
+              <a:t>done) </a:t>
+            </a:r>
+            <a:r>
+              <a:rPr lang="en-US" sz="1100" b="1" dirty="0">
+                <a:solidFill>
+                  <a:srgbClr val="000000"/>
+                </a:solidFill>
+                <a:latin typeface="Monaco"/>
+              </a:rPr>
+              <a:t>{</a:t>
             </a:r>
           </a:p>
           <a:p>
@@ -6995,19 +7298,10 @@
                 </a:solidFill>
                 <a:latin typeface="Monaco"/>
               </a:rPr>
-              <a:t>     </a:t>
-            </a:r>
-            <a:r>
-              <a:rPr lang="en-US" sz="1100">
-                <a:solidFill>
-                  <a:srgbClr val="000000"/>
-                </a:solidFill>
-                <a:latin typeface="Monaco"/>
-              </a:rPr>
-              <a:t> </a:t>
-            </a:r>
-            <a:r>
-              <a:rPr lang="en-US" sz="1100" smtClean="0">
+              <a:t>      </a:t>
+            </a:r>
+            <a:r>
+              <a:rPr lang="en-US" sz="1100" dirty="0" smtClean="0">
                 <a:solidFill>
                   <a:srgbClr val="000000"/>
                 </a:solidFill>
@@ -7073,8 +7367,23 @@
                 </a:solidFill>
                 <a:latin typeface="Monaco"/>
               </a:rPr>
-              <a:t>    callback();</a:t>
-            </a:r>
+              <a:t>    </a:t>
+            </a:r>
+            <a:r>
+              <a:rPr lang="en-US" sz="1100" dirty="0" smtClean="0">
+                <a:solidFill>
+                  <a:srgbClr val="000000"/>
+                </a:solidFill>
+                <a:latin typeface="Monaco"/>
+              </a:rPr>
+              <a:t>done();</a:t>
+            </a:r>
+            <a:endParaRPr lang="en-US" sz="1100" dirty="0">
+              <a:solidFill>
+                <a:srgbClr val="000000"/>
+              </a:solidFill>
+              <a:latin typeface="Monaco"/>
+            </a:endParaRPr>
           </a:p>
           <a:p>
             <a:r>
@@ -7412,7 +7721,7 @@
                 <a:latin typeface="Monaco"/>
                 <a:cs typeface="Monaco"/>
               </a:rPr>
-              <a:t>callback</a:t>
+              <a:t>done</a:t>
             </a:r>
             <a:r>
               <a:rPr kumimoji="0" lang="en-US" sz="2000" i="1" u="none" strike="noStrike" cap="none" normalizeH="0" baseline="0" dirty="0" smtClean="0">
@@ -7427,7 +7736,22 @@
                 <a:effectLst/>
                 <a:latin typeface="Calibri" pitchFamily="34" charset="0"/>
               </a:rPr>
-              <a:t> with non-</a:t>
+              <a:t> </a:t>
+            </a:r>
+            <a:r>
+              <a:rPr kumimoji="0" lang="en-US" sz="2000" i="1" u="none" strike="noStrike" cap="none" normalizeH="0" baseline="0" dirty="0" smtClean="0">
+                <a:ln>
+                  <a:noFill/>
+                </a:ln>
+                <a:solidFill>
+                  <a:schemeClr val="tx2">
+                    <a:lumMod val="75000"/>
+                  </a:schemeClr>
+                </a:solidFill>
+                <a:effectLst/>
+                <a:latin typeface="Calibri" pitchFamily="34" charset="0"/>
+              </a:rPr>
+              <a:t>with non-</a:t>
             </a:r>
             <a:r>
               <a:rPr kumimoji="0" lang="en-US" sz="1600" i="1" u="none" strike="noStrike" cap="none" normalizeH="0" baseline="0" dirty="0" smtClean="0">
@@ -7638,7 +7962,19 @@
                 <a:latin typeface="Monaco"/>
                 <a:cs typeface="Monaco"/>
               </a:rPr>
-              <a:t>function(element, callback)</a:t>
+              <a:t>function(element, </a:t>
+            </a:r>
+            <a:r>
+              <a:rPr lang="en-US" sz="1600" i="1" dirty="0" smtClean="0">
+                <a:solidFill>
+                  <a:schemeClr val="tx2">
+                    <a:lumMod val="75000"/>
+                  </a:schemeClr>
+                </a:solidFill>
+                <a:latin typeface="Monaco"/>
+                <a:cs typeface="Monaco"/>
+              </a:rPr>
+              <a:t>done)</a:t>
             </a:r>
             <a:endParaRPr kumimoji="0" lang="en-US" sz="1600" i="1" u="none" strike="noStrike" cap="none" normalizeH="0" baseline="0" dirty="0" smtClean="0">
               <a:ln>
@@ -7677,7 +8013,7 @@
   <p:timing>
     <p:tnLst>
       <p:par>
-        <p:cTn xmlns:p14="http://schemas.microsoft.com/office/powerpoint/2010/main" id="1" dur="indefinite" restart="never" nodeType="tmRoot">
+        <p:cTn id="1" dur="indefinite" restart="never" nodeType="tmRoot">
           <p:childTnLst>
             <p:seq concurrent="1" nextAc="seek">
               <p:cTn id="2" dur="indefinite" nodeType="mainSeq">
@@ -8247,7 +8583,7 @@
   <p:timing>
     <p:tnLst>
       <p:par>
-        <p:cTn xmlns:p14="http://schemas.microsoft.com/office/powerpoint/2010/main" id="1" dur="indefinite" restart="never" nodeType="tmRoot"/>
+        <p:cTn id="1" dur="indefinite" restart="never" nodeType="tmRoot"/>
       </p:par>
     </p:tnLst>
   </p:timing>
@@ -8428,7 +8764,7 @@
         <p:spPr>
           <a:xfrm>
             <a:off x="457199" y="2228434"/>
-            <a:ext cx="5009849" cy="2800766"/>
+            <a:ext cx="5027338" cy="2800767"/>
           </a:xfrm>
           <a:prstGeom prst="rect">
             <a:avLst/>
@@ -8532,7 +8868,36 @@
                 </a:solidFill>
                 <a:latin typeface="Monaco"/>
               </a:rPr>
-              <a:t> square(it, callback) {</a:t>
+              <a:t> square(it, </a:t>
+            </a:r>
+            <a:r>
+              <a:rPr lang="en-US" sz="1100" b="1" dirty="0" smtClean="0">
+                <a:solidFill>
+                  <a:srgbClr val="000000"/>
+                </a:solidFill>
+                <a:latin typeface="Monaco"/>
+              </a:rPr>
+              <a:t>done) {</a:t>
+            </a:r>
+          </a:p>
+          <a:p>
+            <a:r>
+              <a:rPr lang="en-US" sz="1100" b="1" dirty="0">
+                <a:solidFill>
+                  <a:srgbClr val="000000"/>
+                </a:solidFill>
+                <a:latin typeface="Monaco"/>
+              </a:rPr>
+              <a:t> </a:t>
+            </a:r>
+            <a:r>
+              <a:rPr lang="en-US" sz="1100" b="1" dirty="0" smtClean="0">
+                <a:solidFill>
+                  <a:srgbClr val="000000"/>
+                </a:solidFill>
+                <a:latin typeface="Monaco"/>
+              </a:rPr>
+              <a:t>  if (it &gt;= 0) {</a:t>
             </a:r>
           </a:p>
           <a:p>
@@ -8543,17 +8908,46 @@
                 </a:solidFill>
                 <a:latin typeface="Monaco"/>
               </a:rPr>
-              <a:t>  </a:t>
+              <a:t> </a:t>
+            </a:r>
+            <a:r>
+              <a:rPr lang="en-US" sz="1100" dirty="0" smtClean="0">
+                <a:solidFill>
+                  <a:srgbClr val="000000"/>
+                </a:solidFill>
+                <a:latin typeface="Monaco"/>
+              </a:rPr>
+              <a:t>     done(</a:t>
+            </a:r>
+            <a:r>
+              <a:rPr lang="en-US" sz="1100" b="1" dirty="0" smtClean="0">
+                <a:solidFill>
+                  <a:srgbClr val="7F0055"/>
+                </a:solidFill>
+                <a:latin typeface="Monaco"/>
+              </a:rPr>
+              <a:t>null</a:t>
             </a:r>
             <a:r>
               <a:rPr lang="en-US" sz="1100" b="1" dirty="0">
                 <a:solidFill>
-                  <a:srgbClr val="7F0055"/>
-                </a:solidFill>
-                <a:latin typeface="Monaco"/>
-              </a:rPr>
-              <a:t>try</a:t>
-            </a:r>
+                  <a:srgbClr val="000000"/>
+                </a:solidFill>
+                <a:latin typeface="Monaco"/>
+              </a:rPr>
+              <a:t>, it * it</a:t>
+            </a:r>
+            <a:r>
+              <a:rPr lang="en-US" sz="1100" b="1" dirty="0" smtClean="0">
+                <a:solidFill>
+                  <a:srgbClr val="000000"/>
+                </a:solidFill>
+                <a:latin typeface="Monaco"/>
+              </a:rPr>
+              <a:t>);</a:t>
+            </a:r>
+          </a:p>
+          <a:p>
             <a:r>
               <a:rPr lang="en-US" sz="1100" b="1" dirty="0">
                 <a:solidFill>
@@ -8561,27 +8955,42 @@
                 </a:solidFill>
                 <a:latin typeface="Monaco"/>
               </a:rPr>
-              <a:t> {</a:t>
-            </a:r>
-          </a:p>
-          <a:p>
-            <a:r>
-              <a:rPr lang="en-US" sz="1100" dirty="0">
-                <a:solidFill>
-                  <a:srgbClr val="000000"/>
-                </a:solidFill>
-                <a:latin typeface="Monaco"/>
-              </a:rPr>
-              <a:t>    callback(</a:t>
-            </a:r>
+              <a:t> </a:t>
+            </a:r>
+            <a:r>
+              <a:rPr lang="en-US" sz="1100" b="1" dirty="0" smtClean="0">
+                <a:solidFill>
+                  <a:srgbClr val="000000"/>
+                </a:solidFill>
+                <a:latin typeface="Monaco"/>
+              </a:rPr>
+              <a:t>  } else {</a:t>
+            </a:r>
+            <a:endParaRPr lang="en-US" sz="1100" b="1" dirty="0">
+              <a:solidFill>
+                <a:srgbClr val="000000"/>
+              </a:solidFill>
+              <a:latin typeface="Monaco"/>
+            </a:endParaRPr>
+          </a:p>
+          <a:p>
             <a:r>
               <a:rPr lang="en-US" sz="1100" b="1" dirty="0">
                 <a:solidFill>
-                  <a:srgbClr val="7F0055"/>
-                </a:solidFill>
-                <a:latin typeface="Monaco"/>
-              </a:rPr>
-              <a:t>null</a:t>
+                  <a:srgbClr val="000000"/>
+                </a:solidFill>
+                <a:latin typeface="Monaco"/>
+              </a:rPr>
+              <a:t> </a:t>
+            </a:r>
+            <a:r>
+              <a:rPr lang="en-US" sz="1100" b="1" dirty="0" smtClean="0">
+                <a:solidFill>
+                  <a:srgbClr val="000000"/>
+                </a:solidFill>
+                <a:latin typeface="Monaco"/>
+              </a:rPr>
+              <a:t>     done</a:t>
             </a:r>
             <a:r>
               <a:rPr lang="en-US" sz="1100" b="1" dirty="0">
@@ -8590,63 +8999,38 @@
                 </a:solidFill>
                 <a:latin typeface="Monaco"/>
               </a:rPr>
-              <a:t>, it * it);</a:t>
-            </a:r>
-          </a:p>
-          <a:p>
-            <a:r>
-              <a:rPr lang="en-US" sz="1100" dirty="0">
-                <a:solidFill>
-                  <a:srgbClr val="000000"/>
-                </a:solidFill>
-                <a:latin typeface="Monaco"/>
-              </a:rPr>
-              <a:t>  } </a:t>
-            </a:r>
-            <a:r>
-              <a:rPr lang="en-US" sz="1100" b="1" dirty="0">
-                <a:solidFill>
-                  <a:srgbClr val="7F0055"/>
-                </a:solidFill>
-                <a:latin typeface="Monaco"/>
-              </a:rPr>
-              <a:t>catch</a:t>
-            </a:r>
-            <a:r>
-              <a:rPr lang="en-US" sz="1100" b="1" dirty="0">
-                <a:solidFill>
-                  <a:srgbClr val="000000"/>
-                </a:solidFill>
-                <a:latin typeface="Monaco"/>
-              </a:rPr>
-              <a:t> (x) {</a:t>
-            </a:r>
-          </a:p>
-          <a:p>
-            <a:r>
-              <a:rPr lang="en-US" sz="1100" dirty="0">
-                <a:solidFill>
-                  <a:srgbClr val="000000"/>
-                </a:solidFill>
-                <a:latin typeface="Monaco"/>
-              </a:rPr>
-              <a:t>    callback(x);</a:t>
-            </a:r>
-          </a:p>
-          <a:p>
-            <a:r>
-              <a:rPr lang="en-US" sz="1100" dirty="0">
-                <a:solidFill>
-                  <a:srgbClr val="000000"/>
-                </a:solidFill>
-                <a:latin typeface="Monaco"/>
-              </a:rPr>
-              <a:t>  }</a:t>
-            </a:r>
-          </a:p>
-          <a:p>
-            <a:r>
-              <a:rPr lang="en-US" sz="1100" dirty="0">
+              <a:t>(‘the number is less than zero</a:t>
+            </a:r>
+            <a:r>
+              <a:rPr lang="en-US" sz="1100" b="1" dirty="0" smtClean="0">
+                <a:solidFill>
+                  <a:srgbClr val="000000"/>
+                </a:solidFill>
+                <a:latin typeface="Monaco"/>
+              </a:rPr>
+              <a:t>’);</a:t>
+            </a:r>
+          </a:p>
+          <a:p>
+            <a:r>
+              <a:rPr lang="en-US" sz="1100" b="1" dirty="0" smtClean="0">
+                <a:solidFill>
+                  <a:srgbClr val="000000"/>
+                </a:solidFill>
+                <a:latin typeface="Monaco"/>
+              </a:rPr>
+              <a:t>   }</a:t>
+            </a:r>
+            <a:endParaRPr lang="en-US" sz="1100" b="1" dirty="0">
+              <a:solidFill>
+                <a:srgbClr val="000000"/>
+              </a:solidFill>
+              <a:latin typeface="Monaco"/>
+            </a:endParaRPr>
+          </a:p>
+          <a:p>
+            <a:r>
+              <a:rPr lang="en-US" sz="1100" dirty="0" smtClean="0">
                 <a:solidFill>
                   <a:srgbClr val="000000"/>
                 </a:solidFill>
@@ -8807,7 +9191,7 @@
         </p:nvSpPr>
         <p:spPr bwMode="auto">
           <a:xfrm>
-            <a:off x="5715000" y="2971800"/>
+            <a:off x="5701024" y="2975155"/>
             <a:ext cx="2989745" cy="707886"/>
           </a:xfrm>
           <a:prstGeom prst="wedgeRectCallout">
@@ -9043,7 +9427,7 @@
   <p:timing>
     <p:tnLst>
       <p:par>
-        <p:cTn xmlns:p14="http://schemas.microsoft.com/office/powerpoint/2010/main" id="1" dur="indefinite" restart="never" nodeType="tmRoot"/>
+        <p:cTn id="1" dur="indefinite" restart="never" nodeType="tmRoot"/>
       </p:par>
     </p:tnLst>
   </p:timing>
@@ -9291,7 +9675,7 @@
   <p:timing>
     <p:tnLst>
       <p:par>
-        <p:cTn xmlns:p14="http://schemas.microsoft.com/office/powerpoint/2010/main" id="1" dur="indefinite" restart="never" nodeType="tmRoot"/>
+        <p:cTn id="1" dur="indefinite" restart="never" nodeType="tmRoot"/>
       </p:par>
     </p:tnLst>
   </p:timing>
@@ -9496,7 +9880,7 @@
   <p:timing>
     <p:tnLst>
       <p:par>
-        <p:cTn xmlns:p14="http://schemas.microsoft.com/office/powerpoint/2010/main" id="1" dur="indefinite" restart="never" nodeType="tmRoot"/>
+        <p:cTn id="1" dur="indefinite" restart="never" nodeType="tmRoot"/>
       </p:par>
     </p:tnLst>
   </p:timing>
@@ -11098,7 +11482,7 @@
   <p:timing>
     <p:tnLst>
       <p:par>
-        <p:cTn xmlns:p14="http://schemas.microsoft.com/office/powerpoint/2010/main" id="1" dur="indefinite" restart="never" nodeType="tmRoot">
+        <p:cTn id="1" dur="indefinite" restart="never" nodeType="tmRoot">
           <p:childTnLst>
             <p:seq concurrent="1" nextAc="seek">
               <p:cTn id="2" dur="indefinite" nodeType="mainSeq">
@@ -11362,7 +11746,7 @@
   <p:timing>
     <p:tnLst>
       <p:par>
-        <p:cTn xmlns:p14="http://schemas.microsoft.com/office/powerpoint/2010/main" id="1" dur="indefinite" restart="never" nodeType="tmRoot"/>
+        <p:cTn id="1" dur="indefinite" restart="never" nodeType="tmRoot"/>
       </p:par>
     </p:tnLst>
   </p:timing>
@@ -11767,7 +12151,7 @@
   <p:timing>
     <p:tnLst>
       <p:par>
-        <p:cTn xmlns:p14="http://schemas.microsoft.com/office/powerpoint/2010/main" id="1" dur="indefinite" restart="never" nodeType="tmRoot"/>
+        <p:cTn id="1" dur="indefinite" restart="never" nodeType="tmRoot"/>
       </p:par>
     </p:tnLst>
   </p:timing>
@@ -12628,7 +13012,7 @@
   <p:timing>
     <p:tnLst>
       <p:par>
-        <p:cTn xmlns:p14="http://schemas.microsoft.com/office/powerpoint/2010/main" id="1" dur="indefinite" restart="never" nodeType="tmRoot"/>
+        <p:cTn id="1" dur="indefinite" restart="never" nodeType="tmRoot"/>
       </p:par>
     </p:tnLst>
   </p:timing>
@@ -13653,7 +14037,7 @@
   <p:timing>
     <p:tnLst>
       <p:par>
-        <p:cTn xmlns:p14="http://schemas.microsoft.com/office/powerpoint/2010/main" id="1" dur="indefinite" restart="never" nodeType="tmRoot"/>
+        <p:cTn id="1" dur="indefinite" restart="never" nodeType="tmRoot"/>
       </p:par>
     </p:tnLst>
   </p:timing>
@@ -13820,7 +14204,7 @@
   <p:timing>
     <p:tnLst>
       <p:par>
-        <p:cTn xmlns:p14="http://schemas.microsoft.com/office/powerpoint/2010/main" id="1" dur="indefinite" restart="never" nodeType="tmRoot"/>
+        <p:cTn id="1" dur="indefinite" restart="never" nodeType="tmRoot"/>
       </p:par>
     </p:tnLst>
   </p:timing>
@@ -14982,7 +15366,7 @@
   <p:timing>
     <p:tnLst>
       <p:par>
-        <p:cTn xmlns:p14="http://schemas.microsoft.com/office/powerpoint/2010/main" id="1" dur="indefinite" restart="never" nodeType="tmRoot"/>
+        <p:cTn id="1" dur="indefinite" restart="never" nodeType="tmRoot"/>
       </p:par>
     </p:tnLst>
   </p:timing>

</xml_diff>

<commit_message>
Updated the lab to make it faster for the students
Updated the lab to make it faster for the students

Updated the lab to make it faster for the students

Updated the lab to make it faster for the students

Updated the lab to make it faster for the students

Updated the lab to make it faster for the students

Fixed typos

Added comment about the new async version 2.0.0-rc3

Added comment about the new async version 2.0.0-rc3

Added comment about the new async version 2.0.0-rc3

Corrected layout of the quiz

Added the original quiz html file as a reference
</commit_message>
<xml_diff>
--- a/node/lesson-65-async/async.pptx
+++ b/node/lesson-65-async/async.pptx
@@ -1354,7 +1354,7 @@
           <a:noFill/>
           <a:extLst>
             <a:ext uri="{909E8E84-426E-40dd-AFC4-6F175D3DCCD1}">
-              <a14:hiddenFill xmlns:a14="http://schemas.microsoft.com/office/drawing/2010/main" xmlns="">
+              <a14:hiddenFill xmlns="" xmlns:a14="http://schemas.microsoft.com/office/drawing/2010/main">
                 <a:solidFill>
                   <a:srgbClr val="FFFFFF"/>
                 </a:solidFill>
@@ -4690,18 +4690,7 @@
                 <a:ea typeface="Monaco"/>
                 <a:cs typeface="Monaco"/>
               </a:rPr>
-              <a:t>done</a:t>
-            </a:r>
-            <a:r>
-              <a:rPr lang="en-US" sz="1050" dirty="0" smtClean="0">
-                <a:solidFill>
-                  <a:srgbClr val="000000"/>
-                </a:solidFill>
-                <a:latin typeface="Monaco"/>
-                <a:ea typeface="Monaco"/>
-                <a:cs typeface="Monaco"/>
-              </a:rPr>
-              <a:t>(null</a:t>
+              <a:t>done(null</a:t>
             </a:r>
             <a:r>
               <a:rPr lang="en-US" sz="1050" dirty="0">
@@ -4885,18 +4874,7 @@
                 <a:ea typeface="Monaco"/>
                 <a:cs typeface="Monaco"/>
               </a:rPr>
-              <a:t>done</a:t>
-            </a:r>
-            <a:r>
-              <a:rPr lang="en-US" sz="1050" dirty="0" smtClean="0">
-                <a:solidFill>
-                  <a:srgbClr val="000000"/>
-                </a:solidFill>
-                <a:latin typeface="Monaco"/>
-                <a:ea typeface="Monaco"/>
-                <a:cs typeface="Monaco"/>
-              </a:rPr>
-              <a:t>(null</a:t>
+              <a:t>done(null</a:t>
             </a:r>
             <a:r>
               <a:rPr lang="en-US" sz="1050" dirty="0">
@@ -5124,18 +5102,7 @@
                 <a:ea typeface="Monaco"/>
                 <a:cs typeface="Monaco"/>
               </a:rPr>
-              <a:t>done</a:t>
-            </a:r>
-            <a:r>
-              <a:rPr lang="en-US" sz="1050" dirty="0" smtClean="0">
-                <a:solidFill>
-                  <a:srgbClr val="000000"/>
-                </a:solidFill>
-                <a:latin typeface="Monaco"/>
-                <a:ea typeface="Monaco"/>
-                <a:cs typeface="Monaco"/>
-              </a:rPr>
-              <a:t>(null</a:t>
+              <a:t>done(null</a:t>
             </a:r>
             <a:r>
               <a:rPr lang="en-US" sz="1050" dirty="0">
@@ -5341,18 +5308,7 @@
                 <a:ea typeface="Monaco"/>
                 <a:cs typeface="Monaco"/>
               </a:rPr>
-              <a:t>done</a:t>
-            </a:r>
-            <a:r>
-              <a:rPr lang="en-US" sz="1050" dirty="0" smtClean="0">
-                <a:solidFill>
-                  <a:srgbClr val="000000"/>
-                </a:solidFill>
-                <a:latin typeface="Monaco"/>
-                <a:ea typeface="Monaco"/>
-                <a:cs typeface="Monaco"/>
-              </a:rPr>
-              <a:t>(null</a:t>
+              <a:t>done(null</a:t>
             </a:r>
             <a:r>
               <a:rPr lang="en-US" sz="1050" dirty="0">
@@ -7301,23 +7257,47 @@
               <a:t>      </a:t>
             </a:r>
             <a:r>
+              <a:rPr lang="en-US" sz="1100" smtClean="0">
+                <a:solidFill>
+                  <a:srgbClr val="000000"/>
+                </a:solidFill>
+                <a:latin typeface="Monaco"/>
+              </a:rPr>
+              <a:t>return </a:t>
+            </a:r>
+            <a:r>
+              <a:rPr lang="en-US" sz="1100" smtClean="0">
+                <a:solidFill>
+                  <a:srgbClr val="000000"/>
+                </a:solidFill>
+                <a:latin typeface="Monaco"/>
+              </a:rPr>
+              <a:t>done</a:t>
+            </a:r>
+            <a:r>
+              <a:rPr lang="en-US" sz="1100" smtClean="0">
+                <a:solidFill>
+                  <a:srgbClr val="000000"/>
+                </a:solidFill>
+                <a:latin typeface="Monaco"/>
+              </a:rPr>
+              <a:t>(err</a:t>
+            </a:r>
+            <a:r>
               <a:rPr lang="en-US" sz="1100" dirty="0" smtClean="0">
                 <a:solidFill>
                   <a:srgbClr val="000000"/>
                 </a:solidFill>
                 <a:latin typeface="Monaco"/>
               </a:rPr>
-              <a:t>return callback</a:t>
-            </a:r>
-            <a:r>
-              <a:rPr lang="en-US" sz="1100" dirty="0">
-                <a:solidFill>
-                  <a:srgbClr val="000000"/>
-                </a:solidFill>
-                <a:latin typeface="Monaco"/>
-              </a:rPr>
-              <a:t>(err);</a:t>
-            </a:r>
+              <a:t>);</a:t>
+            </a:r>
+            <a:endParaRPr lang="en-US" sz="1100" dirty="0">
+              <a:solidFill>
+                <a:srgbClr val="000000"/>
+              </a:solidFill>
+              <a:latin typeface="Monaco"/>
+            </a:endParaRPr>
           </a:p>
           <a:p>
             <a:r>
@@ -7736,22 +7716,7 @@
                 <a:effectLst/>
                 <a:latin typeface="Calibri" pitchFamily="34" charset="0"/>
               </a:rPr>
-              <a:t> </a:t>
-            </a:r>
-            <a:r>
-              <a:rPr kumimoji="0" lang="en-US" sz="2000" i="1" u="none" strike="noStrike" cap="none" normalizeH="0" baseline="0" dirty="0" smtClean="0">
-                <a:ln>
-                  <a:noFill/>
-                </a:ln>
-                <a:solidFill>
-                  <a:schemeClr val="tx2">
-                    <a:lumMod val="75000"/>
-                  </a:schemeClr>
-                </a:solidFill>
-                <a:effectLst/>
-                <a:latin typeface="Calibri" pitchFamily="34" charset="0"/>
-              </a:rPr>
-              <a:t>with non-</a:t>
+              <a:t> with non-</a:t>
             </a:r>
             <a:r>
               <a:rPr kumimoji="0" lang="en-US" sz="1600" i="1" u="none" strike="noStrike" cap="none" normalizeH="0" baseline="0" dirty="0" smtClean="0">
@@ -7962,19 +7927,7 @@
                 <a:latin typeface="Monaco"/>
                 <a:cs typeface="Monaco"/>
               </a:rPr>
-              <a:t>function(element, </a:t>
-            </a:r>
-            <a:r>
-              <a:rPr lang="en-US" sz="1600" i="1" dirty="0" smtClean="0">
-                <a:solidFill>
-                  <a:schemeClr val="tx2">
-                    <a:lumMod val="75000"/>
-                  </a:schemeClr>
-                </a:solidFill>
-                <a:latin typeface="Monaco"/>
-                <a:cs typeface="Monaco"/>
-              </a:rPr>
-              <a:t>done)</a:t>
+              <a:t>function(element, done)</a:t>
             </a:r>
             <a:endParaRPr kumimoji="0" lang="en-US" sz="1600" i="1" u="none" strike="noStrike" cap="none" normalizeH="0" baseline="0" dirty="0" smtClean="0">
               <a:ln>
@@ -9523,12 +9476,19 @@
             <a:pPr lvl="1"/>
             <a:r>
               <a:rPr lang="en-US" dirty="0" err="1" smtClean="0">
+                <a:solidFill>
+                  <a:srgbClr val="FF0000"/>
+                </a:solidFill>
                 <a:latin typeface="Monaco"/>
                 <a:cs typeface="Monaco"/>
               </a:rPr>
               <a:t>async.waterfall</a:t>
             </a:r>
-            <a:endParaRPr lang="en-US" sz="2000" dirty="0"/>
+            <a:endParaRPr lang="en-US" sz="2000" dirty="0">
+              <a:solidFill>
+                <a:srgbClr val="FF0000"/>
+              </a:solidFill>
+            </a:endParaRPr>
           </a:p>
           <a:p>
             <a:pPr lvl="1"/>
@@ -9583,12 +9543,18 @@
             <a:pPr lvl="1"/>
             <a:r>
               <a:rPr lang="en-US" sz="1800" dirty="0" err="1" smtClean="0">
+                <a:solidFill>
+                  <a:srgbClr val="FF0000"/>
+                </a:solidFill>
                 <a:latin typeface="Monaco"/>
                 <a:cs typeface="Monaco"/>
               </a:rPr>
               <a:t>async.map</a:t>
             </a:r>
             <a:endParaRPr lang="en-US" sz="1800" dirty="0" smtClean="0">
+              <a:solidFill>
+                <a:srgbClr val="FF0000"/>
+              </a:solidFill>
               <a:latin typeface="Monaco"/>
               <a:cs typeface="Monaco"/>
             </a:endParaRPr>

</xml_diff>

<commit_message>
Added changes for version 2.0.0-rc3 of async.
Just descriptions of the changes, not updating the course materials
We will wait until the real release before updating the others.
</commit_message>
<xml_diff>
--- a/node/lesson-65-async/async.pptx
+++ b/node/lesson-65-async/async.pptx
@@ -5,10 +5,10 @@
     <p:sldMasterId id="2147483648" r:id="rId1"/>
   </p:sldMasterIdLst>
   <p:notesMasterIdLst>
-    <p:notesMasterId r:id="rId20"/>
+    <p:notesMasterId r:id="rId21"/>
   </p:notesMasterIdLst>
   <p:handoutMasterIdLst>
-    <p:handoutMasterId r:id="rId21"/>
+    <p:handoutMasterId r:id="rId22"/>
   </p:handoutMasterIdLst>
   <p:sldIdLst>
     <p:sldId id="298" r:id="rId2"/>
@@ -23,17 +23,18 @@
     <p:sldId id="306" r:id="rId11"/>
     <p:sldId id="307" r:id="rId12"/>
     <p:sldId id="308" r:id="rId13"/>
-    <p:sldId id="317" r:id="rId14"/>
-    <p:sldId id="310" r:id="rId15"/>
-    <p:sldId id="311" r:id="rId16"/>
-    <p:sldId id="312" r:id="rId17"/>
-    <p:sldId id="313" r:id="rId18"/>
-    <p:sldId id="314" r:id="rId19"/>
+    <p:sldId id="318" r:id="rId14"/>
+    <p:sldId id="317" r:id="rId15"/>
+    <p:sldId id="310" r:id="rId16"/>
+    <p:sldId id="311" r:id="rId17"/>
+    <p:sldId id="312" r:id="rId18"/>
+    <p:sldId id="313" r:id="rId19"/>
+    <p:sldId id="314" r:id="rId20"/>
   </p:sldIdLst>
   <p:sldSz cx="9144000" cy="6858000" type="screen4x3"/>
   <p:notesSz cx="6858000" cy="9144000"/>
   <p:custDataLst>
-    <p:tags r:id="rId22"/>
+    <p:tags r:id="rId23"/>
   </p:custDataLst>
   <p:defaultTextStyle>
     <a:defPPr>
@@ -790,7 +791,7 @@
             <a:fld id="{FEB94C41-AFE7-4A1F-AB5D-F6B560C16046}" type="slidenum">
               <a:rPr lang="en-US" smtClean="0"/>
               <a:pPr/>
-              <a:t>17</a:t>
+              <a:t>18</a:t>
             </a:fld>
             <a:endParaRPr lang="en-US"/>
           </a:p>
@@ -875,7 +876,7 @@
             <a:fld id="{6AFC80D5-740B-4CAF-B407-EC08971373CE}" type="slidenum">
               <a:rPr lang="en-US" smtClean="0"/>
               <a:pPr/>
-              <a:t>18</a:t>
+              <a:t>19</a:t>
             </a:fld>
             <a:endParaRPr lang="en-US" dirty="0"/>
           </a:p>
@@ -1354,7 +1355,7 @@
           <a:noFill/>
           <a:extLst>
             <a:ext uri="{909E8E84-426E-40dd-AFC4-6F175D3DCCD1}">
-              <a14:hiddenFill xmlns="" xmlns:a14="http://schemas.microsoft.com/office/drawing/2010/main">
+              <a14:hiddenFill xmlns:a14="http://schemas.microsoft.com/office/drawing/2010/main" xmlns="">
                 <a:solidFill>
                   <a:srgbClr val="FFFFFF"/>
                 </a:solidFill>
@@ -4211,8 +4212,15 @@
           <a:p>
             <a:r>
               <a:rPr lang="en-US" dirty="0" smtClean="0"/>
-              <a:t>On success, callback receives object of results</a:t>
-            </a:r>
+              <a:t>On success, callback receives object of </a:t>
+            </a:r>
+            <a:r>
+              <a:rPr lang="en-US" dirty="0" smtClean="0"/>
+              <a:t>results</a:t>
+            </a:r>
+          </a:p>
+          <a:p>
+            <a:pPr lvl="2"/>
             <a:endParaRPr lang="en-US" dirty="0"/>
           </a:p>
         </p:txBody>
@@ -6168,23 +6176,104 @@
           <a:lstStyle/>
           <a:p>
             <a:r>
+              <a:rPr lang="en-US" smtClean="0"/>
+              <a:t>As </a:t>
+            </a:r>
+            <a:r>
               <a:rPr lang="en-US" dirty="0" smtClean="0"/>
-              <a:t>Collection </a:t>
-            </a:r>
-            <a:r>
-              <a:rPr lang="en-US" dirty="0"/>
-              <a:t>processing features asynchronous </a:t>
+              <a:t>of versions </a:t>
+            </a:r>
+            <a:r>
+              <a:rPr lang="en-US" dirty="0" smtClean="0">
+                <a:solidFill>
+                  <a:srgbClr val="FF0000"/>
+                </a:solidFill>
+              </a:rPr>
+              <a:t>2.0.0-rc3</a:t>
             </a:r>
             <a:r>
               <a:rPr lang="en-US" dirty="0" smtClean="0"/>
-              <a:t>functions</a:t>
+              <a:t>, the signature of the tasks has changed.</a:t>
+            </a:r>
+          </a:p>
+          <a:p>
+            <a:pPr lvl="1"/>
+            <a:r>
+              <a:rPr lang="en-US" dirty="0" smtClean="0"/>
+              <a:t>Signature: </a:t>
+            </a:r>
+            <a:r>
+              <a:rPr lang="en-US" dirty="0" smtClean="0">
+                <a:solidFill>
+                  <a:srgbClr val="FF0000"/>
+                </a:solidFill>
+              </a:rPr>
+              <a:t>functio</a:t>
+            </a:r>
+            <a:r>
+              <a:rPr lang="en-US" dirty="0" smtClean="0">
+                <a:solidFill>
+                  <a:srgbClr val="FF0000"/>
+                </a:solidFill>
+              </a:rPr>
+              <a:t>n task(results, callback)</a:t>
+            </a:r>
+          </a:p>
+          <a:p>
+            <a:pPr lvl="2"/>
+            <a:r>
+              <a:rPr lang="en-US" dirty="0" smtClean="0"/>
+              <a:t>For all the tasks with dependencies</a:t>
+            </a:r>
+          </a:p>
+          <a:p>
+            <a:pPr lvl="2"/>
+            <a:r>
+              <a:rPr lang="en-US" dirty="0" smtClean="0"/>
+              <a:t>Variable </a:t>
+            </a:r>
+            <a:r>
+              <a:rPr lang="en-US" dirty="0" smtClean="0">
+                <a:solidFill>
+                  <a:srgbClr val="FF0000"/>
+                </a:solidFill>
+              </a:rPr>
+              <a:t>results</a:t>
+            </a:r>
+            <a:r>
+              <a:rPr lang="en-US" dirty="0" smtClean="0"/>
+              <a:t> is a hash of current results</a:t>
             </a:r>
             <a:endParaRPr lang="en-US" dirty="0"/>
           </a:p>
           <a:p>
-            <a:pPr marL="0" indent="0">
-              <a:buNone/>
-            </a:pPr>
+            <a:pPr lvl="1"/>
+            <a:r>
+              <a:rPr lang="en-US" dirty="0" smtClean="0"/>
+              <a:t>Signature: </a:t>
+            </a:r>
+            <a:r>
+              <a:rPr lang="en-US" dirty="0" smtClean="0">
+                <a:solidFill>
+                  <a:srgbClr val="FF0000"/>
+                </a:solidFill>
+              </a:rPr>
+              <a:t>function task(callback)</a:t>
+            </a:r>
+          </a:p>
+          <a:p>
+            <a:pPr lvl="2"/>
+            <a:r>
+              <a:rPr lang="en-US" dirty="0" smtClean="0"/>
+              <a:t>For tasks with NO dependencies</a:t>
+            </a:r>
+          </a:p>
+          <a:p>
+            <a:pPr lvl="2"/>
+            <a:endParaRPr lang="en-US" dirty="0" smtClean="0"/>
+          </a:p>
+          <a:p>
+            <a:pPr lvl="2"/>
             <a:endParaRPr lang="en-US" dirty="0"/>
           </a:p>
         </p:txBody>
@@ -6206,11 +6295,7 @@
           <a:p>
             <a:r>
               <a:rPr lang="en-US" dirty="0" err="1" smtClean="0"/>
-              <a:t>Async</a:t>
-            </a:r>
-            <a:r>
-              <a:rPr lang="en-US" dirty="0" smtClean="0"/>
-              <a:t>: Collections</a:t>
+              <a:t>async.auto</a:t>
             </a:r>
             <a:endParaRPr lang="en-US" dirty="0"/>
           </a:p>
@@ -6243,6 +6328,147 @@
               <a:rPr lang="en-US" smtClean="0"/>
               <a:pPr/>
               <a:t>13</a:t>
+            </a:fld>
+            <a:endParaRPr lang="en-US" dirty="0"/>
+          </a:p>
+        </p:txBody>
+      </p:sp>
+    </p:spTree>
+    <p:extLst>
+      <p:ext uri="{BB962C8B-B14F-4D97-AF65-F5344CB8AC3E}">
+        <p14:creationId xmlns:p14="http://schemas.microsoft.com/office/powerpoint/2010/main" val="611965953"/>
+      </p:ext>
+    </p:extLst>
+  </p:cSld>
+  <p:clrMapOvr>
+    <a:masterClrMapping/>
+  </p:clrMapOvr>
+  <mc:AlternateContent xmlns:mc="http://schemas.openxmlformats.org/markup-compatibility/2006" xmlns:p14="http://schemas.microsoft.com/office/powerpoint/2010/main">
+    <mc:Choice Requires="p14">
+      <p:transition p14:dur="0"/>
+    </mc:Choice>
+    <mc:Fallback xmlns="">
+      <p:transition/>
+    </mc:Fallback>
+  </mc:AlternateContent>
+  <p:timing>
+    <p:tnLst>
+      <p:par>
+        <p:cTn id="1" dur="indefinite" restart="never" nodeType="tmRoot"/>
+      </p:par>
+    </p:tnLst>
+  </p:timing>
+</p:sld>
+</file>
+
+<file path=ppt/slides/slide14.xml><?xml version="1.0" encoding="utf-8"?>
+<p:sld xmlns:a="http://schemas.openxmlformats.org/drawingml/2006/main" xmlns:r="http://schemas.openxmlformats.org/officeDocument/2006/relationships" xmlns:p="http://schemas.openxmlformats.org/presentationml/2006/main">
+  <p:cSld>
+    <p:spTree>
+      <p:nvGrpSpPr>
+        <p:cNvPr id="1" name=""/>
+        <p:cNvGrpSpPr/>
+        <p:nvPr/>
+      </p:nvGrpSpPr>
+      <p:grpSpPr>
+        <a:xfrm>
+          <a:off x="0" y="0"/>
+          <a:ext cx="0" cy="0"/>
+          <a:chOff x="0" y="0"/>
+          <a:chExt cx="0" cy="0"/>
+        </a:xfrm>
+      </p:grpSpPr>
+      <p:sp>
+        <p:nvSpPr>
+          <p:cNvPr id="3" name="Content Placeholder 2"/>
+          <p:cNvSpPr>
+            <a:spLocks noGrp="1"/>
+          </p:cNvSpPr>
+          <p:nvPr>
+            <p:ph type="body" sz="quarter" idx="12"/>
+          </p:nvPr>
+        </p:nvSpPr>
+        <p:spPr/>
+        <p:txBody>
+          <a:bodyPr/>
+          <a:lstStyle/>
+          <a:p>
+            <a:r>
+              <a:rPr lang="en-US" dirty="0" smtClean="0"/>
+              <a:t>Collection </a:t>
+            </a:r>
+            <a:r>
+              <a:rPr lang="en-US" dirty="0"/>
+              <a:t>processing features asynchronous </a:t>
+            </a:r>
+            <a:r>
+              <a:rPr lang="en-US" dirty="0" smtClean="0"/>
+              <a:t>functions</a:t>
+            </a:r>
+            <a:endParaRPr lang="en-US" dirty="0"/>
+          </a:p>
+          <a:p>
+            <a:pPr marL="0" indent="0">
+              <a:buNone/>
+            </a:pPr>
+            <a:endParaRPr lang="en-US" dirty="0"/>
+          </a:p>
+        </p:txBody>
+      </p:sp>
+      <p:sp>
+        <p:nvSpPr>
+          <p:cNvPr id="2" name="Title 1"/>
+          <p:cNvSpPr>
+            <a:spLocks noGrp="1"/>
+          </p:cNvSpPr>
+          <p:nvPr>
+            <p:ph type="title"/>
+          </p:nvPr>
+        </p:nvSpPr>
+        <p:spPr/>
+        <p:txBody>
+          <a:bodyPr/>
+          <a:lstStyle/>
+          <a:p>
+            <a:r>
+              <a:rPr lang="en-US" dirty="0" err="1" smtClean="0"/>
+              <a:t>Async</a:t>
+            </a:r>
+            <a:r>
+              <a:rPr lang="en-US" dirty="0" smtClean="0"/>
+              <a:t>: Collections</a:t>
+            </a:r>
+            <a:endParaRPr lang="en-US" dirty="0"/>
+          </a:p>
+        </p:txBody>
+      </p:sp>
+      <p:sp>
+        <p:nvSpPr>
+          <p:cNvPr id="4" name="Slide Number Placeholder 3"/>
+          <p:cNvSpPr>
+            <a:spLocks noGrp="1"/>
+          </p:cNvSpPr>
+          <p:nvPr>
+            <p:ph type="sldNum" sz="quarter" idx="4294967295"/>
+          </p:nvPr>
+        </p:nvSpPr>
+        <p:spPr>
+          <a:xfrm>
+            <a:off x="8237538" y="6553200"/>
+            <a:ext cx="906462" cy="457200"/>
+          </a:xfrm>
+          <a:prstGeom prst="rect">
+            <a:avLst/>
+          </a:prstGeom>
+        </p:spPr>
+        <p:txBody>
+          <a:bodyPr/>
+          <a:lstStyle/>
+          <a:p>
+            <a:fld id="{0D854ACF-EFF3-42D3-AB5F-408268493A1F}" type="slidenum">
+              <a:rPr lang="en-US" smtClean="0"/>
+              <a:pPr/>
+              <a:t>14</a:t>
             </a:fld>
             <a:endParaRPr lang="en-US" dirty="0"/>
           </a:p>
@@ -6518,7 +6744,7 @@
 </p:sld>
 </file>
 
-<file path=ppt/slides/slide14.xml><?xml version="1.0" encoding="utf-8"?>
+<file path=ppt/slides/slide15.xml><?xml version="1.0" encoding="utf-8"?>
 <p:sld xmlns:a="http://schemas.openxmlformats.org/drawingml/2006/main" xmlns:r="http://schemas.openxmlformats.org/officeDocument/2006/relationships" xmlns:p="http://schemas.openxmlformats.org/presentationml/2006/main">
   <p:cSld>
     <p:spTree>
@@ -6830,7 +7056,7 @@
             <a:fld id="{0D854ACF-EFF3-42D3-AB5F-408268493A1F}" type="slidenum">
               <a:rPr lang="en-US" smtClean="0"/>
               <a:pPr/>
-              <a:t>14</a:t>
+              <a:t>15</a:t>
             </a:fld>
             <a:endParaRPr lang="en-US" dirty="0"/>
           </a:p>
@@ -6864,7 +7090,7 @@
 </p:sld>
 </file>
 
-<file path=ppt/slides/slide15.xml><?xml version="1.0" encoding="utf-8"?>
+<file path=ppt/slides/slide16.xml><?xml version="1.0" encoding="utf-8"?>
 <p:sld xmlns:a="http://schemas.openxmlformats.org/drawingml/2006/main" xmlns:r="http://schemas.openxmlformats.org/officeDocument/2006/relationships" xmlns:p="http://schemas.openxmlformats.org/presentationml/2006/main">
   <p:cSld>
     <p:spTree>
@@ -6934,7 +7160,7 @@
             <a:fld id="{0D854ACF-EFF3-42D3-AB5F-408268493A1F}" type="slidenum">
               <a:rPr lang="en-US" smtClean="0"/>
               <a:pPr/>
-              <a:t>15</a:t>
+              <a:t>16</a:t>
             </a:fld>
             <a:endParaRPr lang="en-US" dirty="0"/>
           </a:p>
@@ -7263,25 +7489,7 @@
                 </a:solidFill>
                 <a:latin typeface="Monaco"/>
               </a:rPr>
-              <a:t>return </a:t>
-            </a:r>
-            <a:r>
-              <a:rPr lang="en-US" sz="1100" smtClean="0">
-                <a:solidFill>
-                  <a:srgbClr val="000000"/>
-                </a:solidFill>
-                <a:latin typeface="Monaco"/>
-              </a:rPr>
-              <a:t>done</a:t>
-            </a:r>
-            <a:r>
-              <a:rPr lang="en-US" sz="1100" smtClean="0">
-                <a:solidFill>
-                  <a:srgbClr val="000000"/>
-                </a:solidFill>
-                <a:latin typeface="Monaco"/>
-              </a:rPr>
-              <a:t>(err</a:t>
+              <a:t>return done(err</a:t>
             </a:r>
             <a:r>
               <a:rPr lang="en-US" sz="1100" dirty="0" smtClean="0">
@@ -8136,7 +8344,7 @@
 </p:sld>
 </file>
 
-<file path=ppt/slides/slide16.xml><?xml version="1.0" encoding="utf-8"?>
+<file path=ppt/slides/slide17.xml><?xml version="1.0" encoding="utf-8"?>
 <p:sld xmlns:a="http://schemas.openxmlformats.org/drawingml/2006/main" xmlns:r="http://schemas.openxmlformats.org/officeDocument/2006/relationships" xmlns:p="http://schemas.openxmlformats.org/presentationml/2006/main">
   <p:cSld>
     <p:spTree>
@@ -8509,7 +8717,7 @@
             <a:fld id="{0D854ACF-EFF3-42D3-AB5F-408268493A1F}" type="slidenum">
               <a:rPr lang="en-US" smtClean="0"/>
               <a:pPr/>
-              <a:t>16</a:t>
+              <a:t>17</a:t>
             </a:fld>
             <a:endParaRPr lang="en-US" dirty="0"/>
           </a:p>
@@ -8543,7 +8751,7 @@
 </p:sld>
 </file>
 
-<file path=ppt/slides/slide17.xml><?xml version="1.0" encoding="utf-8"?>
+<file path=ppt/slides/slide18.xml><?xml version="1.0" encoding="utf-8"?>
 <p:sld xmlns:a="http://schemas.openxmlformats.org/drawingml/2006/main" xmlns:r="http://schemas.openxmlformats.org/officeDocument/2006/relationships" xmlns:p="http://schemas.openxmlformats.org/presentationml/2006/main">
   <p:cSld>
     <p:spTree>
@@ -8702,7 +8910,7 @@
             <a:fld id="{0D854ACF-EFF3-42D3-AB5F-408268493A1F}" type="slidenum">
               <a:rPr lang="en-US" smtClean="0"/>
               <a:pPr/>
-              <a:t>17</a:t>
+              <a:t>18</a:t>
             </a:fld>
             <a:endParaRPr lang="en-US" dirty="0"/>
           </a:p>
@@ -9387,7 +9595,7 @@
 </p:sld>
 </file>
 
-<file path=ppt/slides/slide18.xml><?xml version="1.0" encoding="utf-8"?>
+<file path=ppt/slides/slide19.xml><?xml version="1.0" encoding="utf-8"?>
 <p:sld xmlns:a="http://schemas.openxmlformats.org/drawingml/2006/main" xmlns:r="http://schemas.openxmlformats.org/officeDocument/2006/relationships" xmlns:p="http://schemas.openxmlformats.org/presentationml/2006/main">
   <p:cSld>
     <p:spTree>
@@ -9614,7 +9822,7 @@
               <a:pPr>
                 <a:defRPr/>
               </a:pPr>
-              <a:t>18</a:t>
+              <a:t>19</a:t>
             </a:fld>
             <a:endParaRPr lang="en-US"/>
           </a:p>

</xml_diff>

<commit_message>
Updated async to use version 2.x of the module
</commit_message>
<xml_diff>
--- a/node/lesson-65-async/async.pptx
+++ b/node/lesson-65-async/async.pptx
@@ -1355,7 +1355,7 @@
           <a:noFill/>
           <a:extLst>
             <a:ext uri="{909E8E84-426E-40dd-AFC4-6F175D3DCCD1}">
-              <a14:hiddenFill xmlns:a14="http://schemas.microsoft.com/office/drawing/2010/main" xmlns="">
+              <a14:hiddenFill xmlns="" xmlns:a14="http://schemas.microsoft.com/office/drawing/2010/main">
                 <a:solidFill>
                   <a:srgbClr val="FFFFFF"/>
                 </a:solidFill>
@@ -4212,11 +4212,7 @@
           <a:p>
             <a:r>
               <a:rPr lang="en-US" dirty="0" smtClean="0"/>
-              <a:t>On success, callback receives object of </a:t>
-            </a:r>
-            <a:r>
-              <a:rPr lang="en-US" dirty="0" smtClean="0"/>
-              <a:t>results</a:t>
+              <a:t>On success, callback receives object of results</a:t>
             </a:r>
           </a:p>
           <a:p>
@@ -5018,7 +5014,7 @@
                 <a:ea typeface="Monaco"/>
                 <a:cs typeface="Monaco"/>
               </a:rPr>
-              <a:t>function(done, </a:t>
+              <a:t>function(results, done) </a:t>
             </a:r>
             <a:r>
               <a:rPr lang="en-US" sz="1050" dirty="0">
@@ -5029,7 +5025,7 @@
                 <a:ea typeface="Monaco"/>
                 <a:cs typeface="Monaco"/>
               </a:rPr>
-              <a:t>results) {</a:t>
+              <a:t>{</a:t>
             </a:r>
           </a:p>
           <a:p>
@@ -5224,7 +5220,7 @@
                 <a:ea typeface="Monaco"/>
                 <a:cs typeface="Monaco"/>
               </a:rPr>
-              <a:t>function(done, </a:t>
+              <a:t>function(results, done) </a:t>
             </a:r>
             <a:r>
               <a:rPr lang="en-US" sz="1050" dirty="0">
@@ -5235,7 +5231,7 @@
                 <a:ea typeface="Monaco"/>
                 <a:cs typeface="Monaco"/>
               </a:rPr>
-              <a:t>results) {</a:t>
+              <a:t>{</a:t>
             </a:r>
           </a:p>
           <a:p>
@@ -6176,12 +6172,8 @@
           <a:lstStyle/>
           <a:p>
             <a:r>
-              <a:rPr lang="en-US" smtClean="0"/>
-              <a:t>As </a:t>
-            </a:r>
-            <a:r>
               <a:rPr lang="en-US" dirty="0" smtClean="0"/>
-              <a:t>of versions </a:t>
+              <a:t>As of versions </a:t>
             </a:r>
             <a:r>
               <a:rPr lang="en-US" dirty="0" smtClean="0">
@@ -6189,11 +6181,15 @@
                   <a:srgbClr val="FF0000"/>
                 </a:solidFill>
               </a:rPr>
-              <a:t>2.0.0-rc3</a:t>
+              <a:t>2.0.x</a:t>
             </a:r>
             <a:r>
               <a:rPr lang="en-US" dirty="0" smtClean="0"/>
-              <a:t>, the signature of the tasks has changed.</a:t>
+              <a:t>, </a:t>
+            </a:r>
+            <a:r>
+              <a:rPr lang="en-US" dirty="0" smtClean="0"/>
+              <a:t>the signature of the tasks has changed.</a:t>
             </a:r>
           </a:p>
           <a:p>
@@ -6208,15 +6204,7 @@
                   <a:srgbClr val="FF0000"/>
                 </a:solidFill>
               </a:rPr>
-              <a:t>functio</a:t>
-            </a:r>
-            <a:r>
-              <a:rPr lang="en-US" dirty="0" smtClean="0">
-                <a:solidFill>
-                  <a:srgbClr val="FF0000"/>
-                </a:solidFill>
-              </a:rPr>
-              <a:t>n task(results, callback)</a:t>
+              <a:t>function task(results, callback)</a:t>
             </a:r>
           </a:p>
           <a:p>
@@ -6265,16 +6253,19 @@
             <a:pPr lvl="2"/>
             <a:r>
               <a:rPr lang="en-US" dirty="0" smtClean="0"/>
-              <a:t>For tasks with NO dependencies</a:t>
-            </a:r>
-          </a:p>
-          <a:p>
-            <a:pPr lvl="2"/>
+              <a:t>For tasks with NO </a:t>
+            </a:r>
+            <a:r>
+              <a:rPr lang="en-US" dirty="0" smtClean="0"/>
+              <a:t>dependencies</a:t>
+            </a:r>
+          </a:p>
+          <a:p>
+            <a:r>
+              <a:rPr lang="en-US" dirty="0" smtClean="0"/>
+              <a:t>The solutions example uses version 2.1.x</a:t>
+            </a:r>
             <a:endParaRPr lang="en-US" dirty="0" smtClean="0"/>
-          </a:p>
-          <a:p>
-            <a:pPr lvl="2"/>
-            <a:endParaRPr lang="en-US" dirty="0"/>
           </a:p>
         </p:txBody>
       </p:sp>

</xml_diff>